<commit_message>
Change the visibility use the images/ as my image hosting service
</commit_message>
<xml_diff>
--- a/unclassified/some-figures.pptx
+++ b/unclassified/some-figures.pptx
@@ -284,7 +284,7 @@
           <a:p>
             <a:fld id="{737C3AF2-EFB0-484F-90DC-D41FFB6F2D8E}" type="datetimeFigureOut">
               <a:rPr lang="zh-CN" altLang="en-US" smtClean="0"/>
-              <a:t>2025/4/25</a:t>
+              <a:t>2025/5/13</a:t>
             </a:fld>
             <a:endParaRPr lang="zh-CN" altLang="en-US"/>
           </a:p>
@@ -482,7 +482,7 @@
           <a:p>
             <a:fld id="{737C3AF2-EFB0-484F-90DC-D41FFB6F2D8E}" type="datetimeFigureOut">
               <a:rPr lang="zh-CN" altLang="en-US" smtClean="0"/>
-              <a:t>2025/4/25</a:t>
+              <a:t>2025/5/13</a:t>
             </a:fld>
             <a:endParaRPr lang="zh-CN" altLang="en-US"/>
           </a:p>
@@ -690,7 +690,7 @@
           <a:p>
             <a:fld id="{737C3AF2-EFB0-484F-90DC-D41FFB6F2D8E}" type="datetimeFigureOut">
               <a:rPr lang="zh-CN" altLang="en-US" smtClean="0"/>
-              <a:t>2025/4/25</a:t>
+              <a:t>2025/5/13</a:t>
             </a:fld>
             <a:endParaRPr lang="zh-CN" altLang="en-US"/>
           </a:p>
@@ -888,7 +888,7 @@
           <a:p>
             <a:fld id="{737C3AF2-EFB0-484F-90DC-D41FFB6F2D8E}" type="datetimeFigureOut">
               <a:rPr lang="zh-CN" altLang="en-US" smtClean="0"/>
-              <a:t>2025/4/25</a:t>
+              <a:t>2025/5/13</a:t>
             </a:fld>
             <a:endParaRPr lang="zh-CN" altLang="en-US"/>
           </a:p>
@@ -1163,7 +1163,7 @@
           <a:p>
             <a:fld id="{737C3AF2-EFB0-484F-90DC-D41FFB6F2D8E}" type="datetimeFigureOut">
               <a:rPr lang="zh-CN" altLang="en-US" smtClean="0"/>
-              <a:t>2025/4/25</a:t>
+              <a:t>2025/5/13</a:t>
             </a:fld>
             <a:endParaRPr lang="zh-CN" altLang="en-US"/>
           </a:p>
@@ -1428,7 +1428,7 @@
           <a:p>
             <a:fld id="{737C3AF2-EFB0-484F-90DC-D41FFB6F2D8E}" type="datetimeFigureOut">
               <a:rPr lang="zh-CN" altLang="en-US" smtClean="0"/>
-              <a:t>2025/4/25</a:t>
+              <a:t>2025/5/13</a:t>
             </a:fld>
             <a:endParaRPr lang="zh-CN" altLang="en-US"/>
           </a:p>
@@ -1840,7 +1840,7 @@
           <a:p>
             <a:fld id="{737C3AF2-EFB0-484F-90DC-D41FFB6F2D8E}" type="datetimeFigureOut">
               <a:rPr lang="zh-CN" altLang="en-US" smtClean="0"/>
-              <a:t>2025/4/25</a:t>
+              <a:t>2025/5/13</a:t>
             </a:fld>
             <a:endParaRPr lang="zh-CN" altLang="en-US"/>
           </a:p>
@@ -1981,7 +1981,7 @@
           <a:p>
             <a:fld id="{737C3AF2-EFB0-484F-90DC-D41FFB6F2D8E}" type="datetimeFigureOut">
               <a:rPr lang="zh-CN" altLang="en-US" smtClean="0"/>
-              <a:t>2025/4/25</a:t>
+              <a:t>2025/5/13</a:t>
             </a:fld>
             <a:endParaRPr lang="zh-CN" altLang="en-US"/>
           </a:p>
@@ -2094,7 +2094,7 @@
           <a:p>
             <a:fld id="{737C3AF2-EFB0-484F-90DC-D41FFB6F2D8E}" type="datetimeFigureOut">
               <a:rPr lang="zh-CN" altLang="en-US" smtClean="0"/>
-              <a:t>2025/4/25</a:t>
+              <a:t>2025/5/13</a:t>
             </a:fld>
             <a:endParaRPr lang="zh-CN" altLang="en-US"/>
           </a:p>
@@ -2405,7 +2405,7 @@
           <a:p>
             <a:fld id="{737C3AF2-EFB0-484F-90DC-D41FFB6F2D8E}" type="datetimeFigureOut">
               <a:rPr lang="zh-CN" altLang="en-US" smtClean="0"/>
-              <a:t>2025/4/25</a:t>
+              <a:t>2025/5/13</a:t>
             </a:fld>
             <a:endParaRPr lang="zh-CN" altLang="en-US"/>
           </a:p>
@@ -2693,7 +2693,7 @@
           <a:p>
             <a:fld id="{737C3AF2-EFB0-484F-90DC-D41FFB6F2D8E}" type="datetimeFigureOut">
               <a:rPr lang="zh-CN" altLang="en-US" smtClean="0"/>
-              <a:t>2025/4/25</a:t>
+              <a:t>2025/5/13</a:t>
             </a:fld>
             <a:endParaRPr lang="zh-CN" altLang="en-US"/>
           </a:p>
@@ -2934,7 +2934,7 @@
           <a:p>
             <a:fld id="{737C3AF2-EFB0-484F-90DC-D41FFB6F2D8E}" type="datetimeFigureOut">
               <a:rPr lang="zh-CN" altLang="en-US" smtClean="0"/>
-              <a:t>2025/4/25</a:t>
+              <a:t>2025/5/13</a:t>
             </a:fld>
             <a:endParaRPr lang="zh-CN" altLang="en-US"/>
           </a:p>
@@ -15368,6 +15368,2320 @@
           <a:chExt cx="0" cy="0"/>
         </a:xfrm>
       </p:grpSpPr>
+      <p:sp>
+        <p:nvSpPr>
+          <p:cNvPr id="3" name="矩形 2">
+            <a:extLst>
+              <a:ext uri="{FF2B5EF4-FFF2-40B4-BE49-F238E27FC236}">
+                <a16:creationId xmlns:a16="http://schemas.microsoft.com/office/drawing/2014/main" id="{C56C838C-50C2-309E-7CF7-98B6748BA0BD}"/>
+              </a:ext>
+            </a:extLst>
+          </p:cNvPr>
+          <p:cNvSpPr/>
+          <p:nvPr/>
+        </p:nvSpPr>
+        <p:spPr>
+          <a:xfrm>
+            <a:off x="514709" y="4117045"/>
+            <a:ext cx="360000" cy="360000"/>
+          </a:xfrm>
+          <a:prstGeom prst="rect">
+            <a:avLst/>
+          </a:prstGeom>
+          <a:solidFill>
+            <a:srgbClr val="CAFFBF"/>
+          </a:solidFill>
+        </p:spPr>
+        <p:style>
+          <a:lnRef idx="2">
+            <a:schemeClr val="accent1">
+              <a:shade val="15000"/>
+            </a:schemeClr>
+          </a:lnRef>
+          <a:fillRef idx="1">
+            <a:schemeClr val="accent1"/>
+          </a:fillRef>
+          <a:effectRef idx="0">
+            <a:schemeClr val="accent1"/>
+          </a:effectRef>
+          <a:fontRef idx="minor">
+            <a:schemeClr val="lt1"/>
+          </a:fontRef>
+        </p:style>
+        <p:txBody>
+          <a:bodyPr rtlCol="0" anchor="ctr"/>
+          <a:lstStyle/>
+          <a:p>
+            <a:pPr algn="ctr"/>
+            <a:endParaRPr lang="zh-CN" altLang="en-US"/>
+          </a:p>
+        </p:txBody>
+      </p:sp>
+      <p:sp>
+        <p:nvSpPr>
+          <p:cNvPr id="4" name="矩形 3">
+            <a:extLst>
+              <a:ext uri="{FF2B5EF4-FFF2-40B4-BE49-F238E27FC236}">
+                <a16:creationId xmlns:a16="http://schemas.microsoft.com/office/drawing/2014/main" id="{A29341A5-5695-6563-8905-E8AF193CAF56}"/>
+              </a:ext>
+            </a:extLst>
+          </p:cNvPr>
+          <p:cNvSpPr/>
+          <p:nvPr/>
+        </p:nvSpPr>
+        <p:spPr>
+          <a:xfrm>
+            <a:off x="923681" y="4117045"/>
+            <a:ext cx="360000" cy="360000"/>
+          </a:xfrm>
+          <a:prstGeom prst="rect">
+            <a:avLst/>
+          </a:prstGeom>
+          <a:solidFill>
+            <a:srgbClr val="CAFFBF"/>
+          </a:solidFill>
+        </p:spPr>
+        <p:style>
+          <a:lnRef idx="2">
+            <a:schemeClr val="accent1">
+              <a:shade val="15000"/>
+            </a:schemeClr>
+          </a:lnRef>
+          <a:fillRef idx="1">
+            <a:schemeClr val="accent1"/>
+          </a:fillRef>
+          <a:effectRef idx="0">
+            <a:schemeClr val="accent1"/>
+          </a:effectRef>
+          <a:fontRef idx="minor">
+            <a:schemeClr val="lt1"/>
+          </a:fontRef>
+        </p:style>
+        <p:txBody>
+          <a:bodyPr rtlCol="0" anchor="ctr"/>
+          <a:lstStyle/>
+          <a:p>
+            <a:pPr algn="ctr"/>
+            <a:endParaRPr lang="zh-CN" altLang="en-US"/>
+          </a:p>
+        </p:txBody>
+      </p:sp>
+      <p:sp>
+        <p:nvSpPr>
+          <p:cNvPr id="5" name="矩形 4">
+            <a:extLst>
+              <a:ext uri="{FF2B5EF4-FFF2-40B4-BE49-F238E27FC236}">
+                <a16:creationId xmlns:a16="http://schemas.microsoft.com/office/drawing/2014/main" id="{B90B0322-E7DF-4EED-BD6F-79102C92DFEB}"/>
+              </a:ext>
+            </a:extLst>
+          </p:cNvPr>
+          <p:cNvSpPr/>
+          <p:nvPr/>
+        </p:nvSpPr>
+        <p:spPr>
+          <a:xfrm>
+            <a:off x="1332653" y="4117045"/>
+            <a:ext cx="360000" cy="360000"/>
+          </a:xfrm>
+          <a:prstGeom prst="rect">
+            <a:avLst/>
+          </a:prstGeom>
+          <a:solidFill>
+            <a:srgbClr val="CAFFBF"/>
+          </a:solidFill>
+        </p:spPr>
+        <p:style>
+          <a:lnRef idx="2">
+            <a:schemeClr val="accent1">
+              <a:shade val="15000"/>
+            </a:schemeClr>
+          </a:lnRef>
+          <a:fillRef idx="1">
+            <a:schemeClr val="accent1"/>
+          </a:fillRef>
+          <a:effectRef idx="0">
+            <a:schemeClr val="accent1"/>
+          </a:effectRef>
+          <a:fontRef idx="minor">
+            <a:schemeClr val="lt1"/>
+          </a:fontRef>
+        </p:style>
+        <p:txBody>
+          <a:bodyPr rtlCol="0" anchor="ctr"/>
+          <a:lstStyle/>
+          <a:p>
+            <a:pPr algn="ctr"/>
+            <a:endParaRPr lang="zh-CN" altLang="en-US"/>
+          </a:p>
+        </p:txBody>
+      </p:sp>
+      <p:sp>
+        <p:nvSpPr>
+          <p:cNvPr id="6" name="矩形 5">
+            <a:extLst>
+              <a:ext uri="{FF2B5EF4-FFF2-40B4-BE49-F238E27FC236}">
+                <a16:creationId xmlns:a16="http://schemas.microsoft.com/office/drawing/2014/main" id="{6729528B-77B1-D56E-8549-7242968CB878}"/>
+              </a:ext>
+            </a:extLst>
+          </p:cNvPr>
+          <p:cNvSpPr/>
+          <p:nvPr/>
+        </p:nvSpPr>
+        <p:spPr>
+          <a:xfrm>
+            <a:off x="1741625" y="4117045"/>
+            <a:ext cx="360000" cy="360000"/>
+          </a:xfrm>
+          <a:prstGeom prst="rect">
+            <a:avLst/>
+          </a:prstGeom>
+          <a:solidFill>
+            <a:srgbClr val="CAFFBF"/>
+          </a:solidFill>
+        </p:spPr>
+        <p:style>
+          <a:lnRef idx="2">
+            <a:schemeClr val="accent1">
+              <a:shade val="15000"/>
+            </a:schemeClr>
+          </a:lnRef>
+          <a:fillRef idx="1">
+            <a:schemeClr val="accent1"/>
+          </a:fillRef>
+          <a:effectRef idx="0">
+            <a:schemeClr val="accent1"/>
+          </a:effectRef>
+          <a:fontRef idx="minor">
+            <a:schemeClr val="lt1"/>
+          </a:fontRef>
+        </p:style>
+        <p:txBody>
+          <a:bodyPr rtlCol="0" anchor="ctr"/>
+          <a:lstStyle/>
+          <a:p>
+            <a:pPr algn="ctr"/>
+            <a:endParaRPr lang="zh-CN" altLang="en-US"/>
+          </a:p>
+        </p:txBody>
+      </p:sp>
+      <p:sp>
+        <p:nvSpPr>
+          <p:cNvPr id="7" name="矩形 6">
+            <a:extLst>
+              <a:ext uri="{FF2B5EF4-FFF2-40B4-BE49-F238E27FC236}">
+                <a16:creationId xmlns:a16="http://schemas.microsoft.com/office/drawing/2014/main" id="{8A4E1479-639D-844B-C04F-6EEEB485EC11}"/>
+              </a:ext>
+            </a:extLst>
+          </p:cNvPr>
+          <p:cNvSpPr/>
+          <p:nvPr/>
+        </p:nvSpPr>
+        <p:spPr>
+          <a:xfrm>
+            <a:off x="2150597" y="4117045"/>
+            <a:ext cx="360000" cy="360000"/>
+          </a:xfrm>
+          <a:prstGeom prst="rect">
+            <a:avLst/>
+          </a:prstGeom>
+          <a:solidFill>
+            <a:srgbClr val="CAFFBF"/>
+          </a:solidFill>
+        </p:spPr>
+        <p:style>
+          <a:lnRef idx="2">
+            <a:schemeClr val="accent1">
+              <a:shade val="15000"/>
+            </a:schemeClr>
+          </a:lnRef>
+          <a:fillRef idx="1">
+            <a:schemeClr val="accent1"/>
+          </a:fillRef>
+          <a:effectRef idx="0">
+            <a:schemeClr val="accent1"/>
+          </a:effectRef>
+          <a:fontRef idx="minor">
+            <a:schemeClr val="lt1"/>
+          </a:fontRef>
+        </p:style>
+        <p:txBody>
+          <a:bodyPr rtlCol="0" anchor="ctr"/>
+          <a:lstStyle/>
+          <a:p>
+            <a:pPr algn="ctr"/>
+            <a:endParaRPr lang="zh-CN" altLang="en-US"/>
+          </a:p>
+        </p:txBody>
+      </p:sp>
+      <p:sp>
+        <p:nvSpPr>
+          <p:cNvPr id="8" name="矩形 7">
+            <a:extLst>
+              <a:ext uri="{FF2B5EF4-FFF2-40B4-BE49-F238E27FC236}">
+                <a16:creationId xmlns:a16="http://schemas.microsoft.com/office/drawing/2014/main" id="{970A5D5F-E976-364B-1D40-68F1F5CCE9DD}"/>
+              </a:ext>
+            </a:extLst>
+          </p:cNvPr>
+          <p:cNvSpPr/>
+          <p:nvPr/>
+        </p:nvSpPr>
+        <p:spPr>
+          <a:xfrm>
+            <a:off x="2559569" y="4117045"/>
+            <a:ext cx="360000" cy="360000"/>
+          </a:xfrm>
+          <a:prstGeom prst="rect">
+            <a:avLst/>
+          </a:prstGeom>
+          <a:solidFill>
+            <a:srgbClr val="CAFFBF"/>
+          </a:solidFill>
+        </p:spPr>
+        <p:style>
+          <a:lnRef idx="2">
+            <a:schemeClr val="accent1">
+              <a:shade val="15000"/>
+            </a:schemeClr>
+          </a:lnRef>
+          <a:fillRef idx="1">
+            <a:schemeClr val="accent1"/>
+          </a:fillRef>
+          <a:effectRef idx="0">
+            <a:schemeClr val="accent1"/>
+          </a:effectRef>
+          <a:fontRef idx="minor">
+            <a:schemeClr val="lt1"/>
+          </a:fontRef>
+        </p:style>
+        <p:txBody>
+          <a:bodyPr rtlCol="0" anchor="ctr"/>
+          <a:lstStyle/>
+          <a:p>
+            <a:pPr algn="ctr"/>
+            <a:endParaRPr lang="zh-CN" altLang="en-US"/>
+          </a:p>
+        </p:txBody>
+      </p:sp>
+      <p:sp>
+        <p:nvSpPr>
+          <p:cNvPr id="9" name="矩形 8">
+            <a:extLst>
+              <a:ext uri="{FF2B5EF4-FFF2-40B4-BE49-F238E27FC236}">
+                <a16:creationId xmlns:a16="http://schemas.microsoft.com/office/drawing/2014/main" id="{1A1E8EB0-BFA5-4326-1AC7-BD15DE8174A0}"/>
+              </a:ext>
+            </a:extLst>
+          </p:cNvPr>
+          <p:cNvSpPr/>
+          <p:nvPr/>
+        </p:nvSpPr>
+        <p:spPr>
+          <a:xfrm>
+            <a:off x="2968541" y="4117045"/>
+            <a:ext cx="360000" cy="360000"/>
+          </a:xfrm>
+          <a:prstGeom prst="rect">
+            <a:avLst/>
+          </a:prstGeom>
+          <a:solidFill>
+            <a:srgbClr val="FDFFB6"/>
+          </a:solidFill>
+        </p:spPr>
+        <p:style>
+          <a:lnRef idx="2">
+            <a:schemeClr val="accent1">
+              <a:shade val="15000"/>
+            </a:schemeClr>
+          </a:lnRef>
+          <a:fillRef idx="1">
+            <a:schemeClr val="accent1"/>
+          </a:fillRef>
+          <a:effectRef idx="0">
+            <a:schemeClr val="accent1"/>
+          </a:effectRef>
+          <a:fontRef idx="minor">
+            <a:schemeClr val="lt1"/>
+          </a:fontRef>
+        </p:style>
+        <p:txBody>
+          <a:bodyPr rtlCol="0" anchor="ctr"/>
+          <a:lstStyle/>
+          <a:p>
+            <a:pPr algn="ctr"/>
+            <a:endParaRPr lang="zh-CN" altLang="en-US"/>
+          </a:p>
+        </p:txBody>
+      </p:sp>
+      <p:sp>
+        <p:nvSpPr>
+          <p:cNvPr id="10" name="矩形 9">
+            <a:extLst>
+              <a:ext uri="{FF2B5EF4-FFF2-40B4-BE49-F238E27FC236}">
+                <a16:creationId xmlns:a16="http://schemas.microsoft.com/office/drawing/2014/main" id="{0509B160-BC9A-3A52-D59C-54C46E1F5008}"/>
+              </a:ext>
+            </a:extLst>
+          </p:cNvPr>
+          <p:cNvSpPr/>
+          <p:nvPr/>
+        </p:nvSpPr>
+        <p:spPr>
+          <a:xfrm>
+            <a:off x="3377512" y="4117045"/>
+            <a:ext cx="360000" cy="360000"/>
+          </a:xfrm>
+          <a:prstGeom prst="rect">
+            <a:avLst/>
+          </a:prstGeom>
+          <a:solidFill>
+            <a:srgbClr val="FDFFB6"/>
+          </a:solidFill>
+        </p:spPr>
+        <p:style>
+          <a:lnRef idx="2">
+            <a:schemeClr val="accent1">
+              <a:shade val="15000"/>
+            </a:schemeClr>
+          </a:lnRef>
+          <a:fillRef idx="1">
+            <a:schemeClr val="accent1"/>
+          </a:fillRef>
+          <a:effectRef idx="0">
+            <a:schemeClr val="accent1"/>
+          </a:effectRef>
+          <a:fontRef idx="minor">
+            <a:schemeClr val="lt1"/>
+          </a:fontRef>
+        </p:style>
+        <p:txBody>
+          <a:bodyPr rtlCol="0" anchor="ctr"/>
+          <a:lstStyle/>
+          <a:p>
+            <a:pPr algn="ctr"/>
+            <a:endParaRPr lang="zh-CN" altLang="en-US"/>
+          </a:p>
+        </p:txBody>
+      </p:sp>
+      <p:sp>
+        <p:nvSpPr>
+          <p:cNvPr id="11" name="矩形 10">
+            <a:extLst>
+              <a:ext uri="{FF2B5EF4-FFF2-40B4-BE49-F238E27FC236}">
+                <a16:creationId xmlns:a16="http://schemas.microsoft.com/office/drawing/2014/main" id="{B3B6B1C1-F709-D581-8918-CDB1B141F8F5}"/>
+              </a:ext>
+            </a:extLst>
+          </p:cNvPr>
+          <p:cNvSpPr/>
+          <p:nvPr/>
+        </p:nvSpPr>
+        <p:spPr>
+          <a:xfrm>
+            <a:off x="4058643" y="4110182"/>
+            <a:ext cx="360000" cy="360000"/>
+          </a:xfrm>
+          <a:prstGeom prst="rect">
+            <a:avLst/>
+          </a:prstGeom>
+          <a:solidFill>
+            <a:srgbClr val="FDFFB6"/>
+          </a:solidFill>
+        </p:spPr>
+        <p:style>
+          <a:lnRef idx="2">
+            <a:schemeClr val="accent1">
+              <a:shade val="15000"/>
+            </a:schemeClr>
+          </a:lnRef>
+          <a:fillRef idx="1">
+            <a:schemeClr val="accent1"/>
+          </a:fillRef>
+          <a:effectRef idx="0">
+            <a:schemeClr val="accent1"/>
+          </a:effectRef>
+          <a:fontRef idx="minor">
+            <a:schemeClr val="lt1"/>
+          </a:fontRef>
+        </p:style>
+        <p:txBody>
+          <a:bodyPr rtlCol="0" anchor="ctr"/>
+          <a:lstStyle/>
+          <a:p>
+            <a:pPr algn="ctr"/>
+            <a:endParaRPr lang="zh-CN" altLang="en-US"/>
+          </a:p>
+        </p:txBody>
+      </p:sp>
+      <p:sp>
+        <p:nvSpPr>
+          <p:cNvPr id="12" name="矩形 11">
+            <a:extLst>
+              <a:ext uri="{FF2B5EF4-FFF2-40B4-BE49-F238E27FC236}">
+                <a16:creationId xmlns:a16="http://schemas.microsoft.com/office/drawing/2014/main" id="{68C0D3B8-B1C9-229C-1E9A-3541D0B72CF2}"/>
+              </a:ext>
+            </a:extLst>
+          </p:cNvPr>
+          <p:cNvSpPr/>
+          <p:nvPr/>
+        </p:nvSpPr>
+        <p:spPr>
+          <a:xfrm>
+            <a:off x="4467615" y="4110182"/>
+            <a:ext cx="360000" cy="360000"/>
+          </a:xfrm>
+          <a:prstGeom prst="rect">
+            <a:avLst/>
+          </a:prstGeom>
+          <a:solidFill>
+            <a:srgbClr val="FDFFB6"/>
+          </a:solidFill>
+        </p:spPr>
+        <p:style>
+          <a:lnRef idx="2">
+            <a:schemeClr val="accent1">
+              <a:shade val="15000"/>
+            </a:schemeClr>
+          </a:lnRef>
+          <a:fillRef idx="1">
+            <a:schemeClr val="accent1"/>
+          </a:fillRef>
+          <a:effectRef idx="0">
+            <a:schemeClr val="accent1"/>
+          </a:effectRef>
+          <a:fontRef idx="minor">
+            <a:schemeClr val="lt1"/>
+          </a:fontRef>
+        </p:style>
+        <p:txBody>
+          <a:bodyPr rtlCol="0" anchor="ctr"/>
+          <a:lstStyle/>
+          <a:p>
+            <a:pPr algn="ctr"/>
+            <a:endParaRPr lang="zh-CN" altLang="en-US"/>
+          </a:p>
+        </p:txBody>
+      </p:sp>
+      <p:sp>
+        <p:nvSpPr>
+          <p:cNvPr id="13" name="矩形 12">
+            <a:extLst>
+              <a:ext uri="{FF2B5EF4-FFF2-40B4-BE49-F238E27FC236}">
+                <a16:creationId xmlns:a16="http://schemas.microsoft.com/office/drawing/2014/main" id="{7CECA5E7-F3E5-F95E-8498-D2BF98A21F25}"/>
+              </a:ext>
+            </a:extLst>
+          </p:cNvPr>
+          <p:cNvSpPr/>
+          <p:nvPr/>
+        </p:nvSpPr>
+        <p:spPr>
+          <a:xfrm>
+            <a:off x="4876587" y="4110182"/>
+            <a:ext cx="360000" cy="360000"/>
+          </a:xfrm>
+          <a:prstGeom prst="rect">
+            <a:avLst/>
+          </a:prstGeom>
+          <a:solidFill>
+            <a:srgbClr val="FDFFB6"/>
+          </a:solidFill>
+        </p:spPr>
+        <p:style>
+          <a:lnRef idx="2">
+            <a:schemeClr val="accent1">
+              <a:shade val="15000"/>
+            </a:schemeClr>
+          </a:lnRef>
+          <a:fillRef idx="1">
+            <a:schemeClr val="accent1"/>
+          </a:fillRef>
+          <a:effectRef idx="0">
+            <a:schemeClr val="accent1"/>
+          </a:effectRef>
+          <a:fontRef idx="minor">
+            <a:schemeClr val="lt1"/>
+          </a:fontRef>
+        </p:style>
+        <p:txBody>
+          <a:bodyPr rtlCol="0" anchor="ctr"/>
+          <a:lstStyle/>
+          <a:p>
+            <a:pPr algn="ctr"/>
+            <a:endParaRPr lang="zh-CN" altLang="en-US"/>
+          </a:p>
+        </p:txBody>
+      </p:sp>
+      <p:sp>
+        <p:nvSpPr>
+          <p:cNvPr id="14" name="矩形 13">
+            <a:extLst>
+              <a:ext uri="{FF2B5EF4-FFF2-40B4-BE49-F238E27FC236}">
+                <a16:creationId xmlns:a16="http://schemas.microsoft.com/office/drawing/2014/main" id="{CA0090EA-7112-C8BF-B68B-0ECE4B96DA15}"/>
+              </a:ext>
+            </a:extLst>
+          </p:cNvPr>
+          <p:cNvSpPr/>
+          <p:nvPr/>
+        </p:nvSpPr>
+        <p:spPr>
+          <a:xfrm>
+            <a:off x="5285559" y="4110182"/>
+            <a:ext cx="360000" cy="360000"/>
+          </a:xfrm>
+          <a:prstGeom prst="rect">
+            <a:avLst/>
+          </a:prstGeom>
+          <a:solidFill>
+            <a:srgbClr val="FDFFB6"/>
+          </a:solidFill>
+        </p:spPr>
+        <p:style>
+          <a:lnRef idx="2">
+            <a:schemeClr val="accent1">
+              <a:shade val="15000"/>
+            </a:schemeClr>
+          </a:lnRef>
+          <a:fillRef idx="1">
+            <a:schemeClr val="accent1"/>
+          </a:fillRef>
+          <a:effectRef idx="0">
+            <a:schemeClr val="accent1"/>
+          </a:effectRef>
+          <a:fontRef idx="minor">
+            <a:schemeClr val="lt1"/>
+          </a:fontRef>
+        </p:style>
+        <p:txBody>
+          <a:bodyPr rtlCol="0" anchor="ctr"/>
+          <a:lstStyle/>
+          <a:p>
+            <a:pPr algn="ctr"/>
+            <a:endParaRPr lang="zh-CN" altLang="en-US"/>
+          </a:p>
+        </p:txBody>
+      </p:sp>
+      <p:sp>
+        <p:nvSpPr>
+          <p:cNvPr id="15" name="矩形 14">
+            <a:extLst>
+              <a:ext uri="{FF2B5EF4-FFF2-40B4-BE49-F238E27FC236}">
+                <a16:creationId xmlns:a16="http://schemas.microsoft.com/office/drawing/2014/main" id="{6241CB8E-E8D1-4C7D-48AB-DBF633101354}"/>
+              </a:ext>
+            </a:extLst>
+          </p:cNvPr>
+          <p:cNvSpPr/>
+          <p:nvPr/>
+        </p:nvSpPr>
+        <p:spPr>
+          <a:xfrm>
+            <a:off x="5694531" y="4110182"/>
+            <a:ext cx="360000" cy="360000"/>
+          </a:xfrm>
+          <a:prstGeom prst="rect">
+            <a:avLst/>
+          </a:prstGeom>
+          <a:solidFill>
+            <a:srgbClr val="FDFFB6"/>
+          </a:solidFill>
+        </p:spPr>
+        <p:style>
+          <a:lnRef idx="2">
+            <a:schemeClr val="accent1">
+              <a:shade val="15000"/>
+            </a:schemeClr>
+          </a:lnRef>
+          <a:fillRef idx="1">
+            <a:schemeClr val="accent1"/>
+          </a:fillRef>
+          <a:effectRef idx="0">
+            <a:schemeClr val="accent1"/>
+          </a:effectRef>
+          <a:fontRef idx="minor">
+            <a:schemeClr val="lt1"/>
+          </a:fontRef>
+        </p:style>
+        <p:txBody>
+          <a:bodyPr rtlCol="0" anchor="ctr"/>
+          <a:lstStyle/>
+          <a:p>
+            <a:pPr algn="ctr"/>
+            <a:endParaRPr lang="zh-CN" altLang="en-US"/>
+          </a:p>
+        </p:txBody>
+      </p:sp>
+      <p:sp>
+        <p:nvSpPr>
+          <p:cNvPr id="16" name="矩形 15">
+            <a:extLst>
+              <a:ext uri="{FF2B5EF4-FFF2-40B4-BE49-F238E27FC236}">
+                <a16:creationId xmlns:a16="http://schemas.microsoft.com/office/drawing/2014/main" id="{50208856-673A-7833-5D0C-B8F3634F80BA}"/>
+              </a:ext>
+            </a:extLst>
+          </p:cNvPr>
+          <p:cNvSpPr/>
+          <p:nvPr/>
+        </p:nvSpPr>
+        <p:spPr>
+          <a:xfrm>
+            <a:off x="6103503" y="4110182"/>
+            <a:ext cx="360000" cy="360000"/>
+          </a:xfrm>
+          <a:prstGeom prst="rect">
+            <a:avLst/>
+          </a:prstGeom>
+          <a:solidFill>
+            <a:srgbClr val="FDFFB6"/>
+          </a:solidFill>
+        </p:spPr>
+        <p:style>
+          <a:lnRef idx="2">
+            <a:schemeClr val="accent1">
+              <a:shade val="15000"/>
+            </a:schemeClr>
+          </a:lnRef>
+          <a:fillRef idx="1">
+            <a:schemeClr val="accent1"/>
+          </a:fillRef>
+          <a:effectRef idx="0">
+            <a:schemeClr val="accent1"/>
+          </a:effectRef>
+          <a:fontRef idx="minor">
+            <a:schemeClr val="lt1"/>
+          </a:fontRef>
+        </p:style>
+        <p:txBody>
+          <a:bodyPr rtlCol="0" anchor="ctr"/>
+          <a:lstStyle/>
+          <a:p>
+            <a:pPr algn="ctr"/>
+            <a:endParaRPr lang="zh-CN" altLang="en-US"/>
+          </a:p>
+        </p:txBody>
+      </p:sp>
+      <p:sp>
+        <p:nvSpPr>
+          <p:cNvPr id="17" name="矩形 16">
+            <a:extLst>
+              <a:ext uri="{FF2B5EF4-FFF2-40B4-BE49-F238E27FC236}">
+                <a16:creationId xmlns:a16="http://schemas.microsoft.com/office/drawing/2014/main" id="{3FEC92ED-E6A0-8A01-8AC6-6F7A008ED140}"/>
+              </a:ext>
+            </a:extLst>
+          </p:cNvPr>
+          <p:cNvSpPr/>
+          <p:nvPr/>
+        </p:nvSpPr>
+        <p:spPr>
+          <a:xfrm>
+            <a:off x="6512475" y="4110182"/>
+            <a:ext cx="360000" cy="360000"/>
+          </a:xfrm>
+          <a:prstGeom prst="rect">
+            <a:avLst/>
+          </a:prstGeom>
+          <a:solidFill>
+            <a:srgbClr val="CAFFBF"/>
+          </a:solidFill>
+        </p:spPr>
+        <p:style>
+          <a:lnRef idx="2">
+            <a:schemeClr val="accent1">
+              <a:shade val="15000"/>
+            </a:schemeClr>
+          </a:lnRef>
+          <a:fillRef idx="1">
+            <a:schemeClr val="accent1"/>
+          </a:fillRef>
+          <a:effectRef idx="0">
+            <a:schemeClr val="accent1"/>
+          </a:effectRef>
+          <a:fontRef idx="minor">
+            <a:schemeClr val="lt1"/>
+          </a:fontRef>
+        </p:style>
+        <p:txBody>
+          <a:bodyPr rtlCol="0" anchor="ctr"/>
+          <a:lstStyle/>
+          <a:p>
+            <a:pPr algn="ctr"/>
+            <a:endParaRPr lang="zh-CN" altLang="en-US"/>
+          </a:p>
+        </p:txBody>
+      </p:sp>
+      <p:sp>
+        <p:nvSpPr>
+          <p:cNvPr id="18" name="矩形 17">
+            <a:extLst>
+              <a:ext uri="{FF2B5EF4-FFF2-40B4-BE49-F238E27FC236}">
+                <a16:creationId xmlns:a16="http://schemas.microsoft.com/office/drawing/2014/main" id="{AF8DBEE2-D9A2-8804-615D-9F2B01C9D6A7}"/>
+              </a:ext>
+            </a:extLst>
+          </p:cNvPr>
+          <p:cNvSpPr/>
+          <p:nvPr/>
+        </p:nvSpPr>
+        <p:spPr>
+          <a:xfrm>
+            <a:off x="6921446" y="4110182"/>
+            <a:ext cx="360000" cy="360000"/>
+          </a:xfrm>
+          <a:prstGeom prst="rect">
+            <a:avLst/>
+          </a:prstGeom>
+          <a:solidFill>
+            <a:srgbClr val="CAFFBF"/>
+          </a:solidFill>
+        </p:spPr>
+        <p:style>
+          <a:lnRef idx="2">
+            <a:schemeClr val="accent1">
+              <a:shade val="15000"/>
+            </a:schemeClr>
+          </a:lnRef>
+          <a:fillRef idx="1">
+            <a:schemeClr val="accent1"/>
+          </a:fillRef>
+          <a:effectRef idx="0">
+            <a:schemeClr val="accent1"/>
+          </a:effectRef>
+          <a:fontRef idx="minor">
+            <a:schemeClr val="lt1"/>
+          </a:fontRef>
+        </p:style>
+        <p:txBody>
+          <a:bodyPr rtlCol="0" anchor="ctr"/>
+          <a:lstStyle/>
+          <a:p>
+            <a:pPr algn="ctr"/>
+            <a:endParaRPr lang="zh-CN" altLang="en-US"/>
+          </a:p>
+        </p:txBody>
+      </p:sp>
+      <p:sp>
+        <p:nvSpPr>
+          <p:cNvPr id="19" name="文本框 18">
+            <a:extLst>
+              <a:ext uri="{FF2B5EF4-FFF2-40B4-BE49-F238E27FC236}">
+                <a16:creationId xmlns:a16="http://schemas.microsoft.com/office/drawing/2014/main" id="{DFF099ED-B602-2AF0-1360-E5F7C9CBF4A4}"/>
+              </a:ext>
+            </a:extLst>
+          </p:cNvPr>
+          <p:cNvSpPr txBox="1"/>
+          <p:nvPr/>
+        </p:nvSpPr>
+        <p:spPr>
+          <a:xfrm>
+            <a:off x="430053" y="3747713"/>
+            <a:ext cx="473206" cy="307777"/>
+          </a:xfrm>
+          <a:prstGeom prst="rect">
+            <a:avLst/>
+          </a:prstGeom>
+          <a:noFill/>
+        </p:spPr>
+        <p:txBody>
+          <a:bodyPr wrap="none" rtlCol="0">
+            <a:spAutoFit/>
+          </a:bodyPr>
+          <a:lstStyle/>
+          <a:p>
+            <a:r>
+              <a:rPr lang="en-US" altLang="zh-CN" sz="1400" b="1">
+                <a:solidFill>
+                  <a:srgbClr val="FF0000"/>
+                </a:solidFill>
+              </a:rPr>
+              <a:t>0x0</a:t>
+            </a:r>
+            <a:endParaRPr lang="zh-CN" altLang="en-US" sz="1400" b="1">
+              <a:solidFill>
+                <a:srgbClr val="FF0000"/>
+              </a:solidFill>
+            </a:endParaRPr>
+          </a:p>
+        </p:txBody>
+      </p:sp>
+      <p:sp>
+        <p:nvSpPr>
+          <p:cNvPr id="20" name="文本框 19">
+            <a:extLst>
+              <a:ext uri="{FF2B5EF4-FFF2-40B4-BE49-F238E27FC236}">
+                <a16:creationId xmlns:a16="http://schemas.microsoft.com/office/drawing/2014/main" id="{C2657DCA-23BB-D11D-87A1-CC3389D79E83}"/>
+              </a:ext>
+            </a:extLst>
+          </p:cNvPr>
+          <p:cNvSpPr txBox="1"/>
+          <p:nvPr/>
+        </p:nvSpPr>
+        <p:spPr>
+          <a:xfrm>
+            <a:off x="3265804" y="3748631"/>
+            <a:ext cx="473206" cy="307777"/>
+          </a:xfrm>
+          <a:prstGeom prst="rect">
+            <a:avLst/>
+          </a:prstGeom>
+          <a:noFill/>
+        </p:spPr>
+        <p:txBody>
+          <a:bodyPr wrap="none" rtlCol="0">
+            <a:spAutoFit/>
+          </a:bodyPr>
+          <a:lstStyle/>
+          <a:p>
+            <a:r>
+              <a:rPr lang="en-US" altLang="zh-CN" sz="1400" b="1">
+                <a:solidFill>
+                  <a:srgbClr val="FF0000"/>
+                </a:solidFill>
+              </a:rPr>
+              <a:t>0x7</a:t>
+            </a:r>
+            <a:endParaRPr lang="zh-CN" altLang="en-US" sz="1400" b="1">
+              <a:solidFill>
+                <a:srgbClr val="FF0000"/>
+              </a:solidFill>
+            </a:endParaRPr>
+          </a:p>
+        </p:txBody>
+      </p:sp>
+      <p:sp>
+        <p:nvSpPr>
+          <p:cNvPr id="21" name="文本框 20">
+            <a:extLst>
+              <a:ext uri="{FF2B5EF4-FFF2-40B4-BE49-F238E27FC236}">
+                <a16:creationId xmlns:a16="http://schemas.microsoft.com/office/drawing/2014/main" id="{84C2CD8D-9403-EC97-2841-49BAAA4C5225}"/>
+              </a:ext>
+            </a:extLst>
+          </p:cNvPr>
+          <p:cNvSpPr txBox="1"/>
+          <p:nvPr/>
+        </p:nvSpPr>
+        <p:spPr>
+          <a:xfrm>
+            <a:off x="3994409" y="3740850"/>
+            <a:ext cx="473206" cy="307777"/>
+          </a:xfrm>
+          <a:prstGeom prst="rect">
+            <a:avLst/>
+          </a:prstGeom>
+          <a:noFill/>
+        </p:spPr>
+        <p:txBody>
+          <a:bodyPr wrap="none" rtlCol="0">
+            <a:spAutoFit/>
+          </a:bodyPr>
+          <a:lstStyle/>
+          <a:p>
+            <a:r>
+              <a:rPr lang="en-US" altLang="zh-CN" sz="1400" b="1">
+                <a:solidFill>
+                  <a:srgbClr val="FF0000"/>
+                </a:solidFill>
+              </a:rPr>
+              <a:t>0x8</a:t>
+            </a:r>
+            <a:endParaRPr lang="zh-CN" altLang="en-US" sz="1400" b="1">
+              <a:solidFill>
+                <a:srgbClr val="FF0000"/>
+              </a:solidFill>
+            </a:endParaRPr>
+          </a:p>
+        </p:txBody>
+      </p:sp>
+      <p:sp>
+        <p:nvSpPr>
+          <p:cNvPr id="22" name="文本框 21">
+            <a:extLst>
+              <a:ext uri="{FF2B5EF4-FFF2-40B4-BE49-F238E27FC236}">
+                <a16:creationId xmlns:a16="http://schemas.microsoft.com/office/drawing/2014/main" id="{299006F6-A62C-8C9D-B1F1-8389495BFF33}"/>
+              </a:ext>
+            </a:extLst>
+          </p:cNvPr>
+          <p:cNvSpPr txBox="1"/>
+          <p:nvPr/>
+        </p:nvSpPr>
+        <p:spPr>
+          <a:xfrm>
+            <a:off x="6885992" y="3740850"/>
+            <a:ext cx="463588" cy="307777"/>
+          </a:xfrm>
+          <a:prstGeom prst="rect">
+            <a:avLst/>
+          </a:prstGeom>
+          <a:noFill/>
+        </p:spPr>
+        <p:txBody>
+          <a:bodyPr wrap="none" rtlCol="0">
+            <a:spAutoFit/>
+          </a:bodyPr>
+          <a:lstStyle/>
+          <a:p>
+            <a:r>
+              <a:rPr lang="en-US" altLang="zh-CN" sz="1400" b="1">
+                <a:solidFill>
+                  <a:srgbClr val="FF0000"/>
+                </a:solidFill>
+              </a:rPr>
+              <a:t>0xF</a:t>
+            </a:r>
+            <a:endParaRPr lang="zh-CN" altLang="en-US" sz="1400" b="1">
+              <a:solidFill>
+                <a:srgbClr val="FF0000"/>
+              </a:solidFill>
+            </a:endParaRPr>
+          </a:p>
+        </p:txBody>
+      </p:sp>
+      <p:sp>
+        <p:nvSpPr>
+          <p:cNvPr id="23" name="文本框 22">
+            <a:extLst>
+              <a:ext uri="{FF2B5EF4-FFF2-40B4-BE49-F238E27FC236}">
+                <a16:creationId xmlns:a16="http://schemas.microsoft.com/office/drawing/2014/main" id="{EBAEB18E-E331-4592-965A-41316C27E579}"/>
+              </a:ext>
+            </a:extLst>
+          </p:cNvPr>
+          <p:cNvSpPr txBox="1"/>
+          <p:nvPr/>
+        </p:nvSpPr>
+        <p:spPr>
+          <a:xfrm>
+            <a:off x="5990297" y="3740850"/>
+            <a:ext cx="502061" cy="307777"/>
+          </a:xfrm>
+          <a:prstGeom prst="rect">
+            <a:avLst/>
+          </a:prstGeom>
+          <a:noFill/>
+        </p:spPr>
+        <p:txBody>
+          <a:bodyPr wrap="none" rtlCol="0">
+            <a:spAutoFit/>
+          </a:bodyPr>
+          <a:lstStyle/>
+          <a:p>
+            <a:r>
+              <a:rPr lang="en-US" altLang="zh-CN" sz="1400" b="1">
+                <a:solidFill>
+                  <a:srgbClr val="FF0000"/>
+                </a:solidFill>
+              </a:rPr>
+              <a:t>0xD</a:t>
+            </a:r>
+            <a:endParaRPr lang="zh-CN" altLang="en-US" sz="1400" b="1">
+              <a:solidFill>
+                <a:srgbClr val="FF0000"/>
+              </a:solidFill>
+            </a:endParaRPr>
+          </a:p>
+        </p:txBody>
+      </p:sp>
+      <p:sp>
+        <p:nvSpPr>
+          <p:cNvPr id="24" name="文本框 23">
+            <a:extLst>
+              <a:ext uri="{FF2B5EF4-FFF2-40B4-BE49-F238E27FC236}">
+                <a16:creationId xmlns:a16="http://schemas.microsoft.com/office/drawing/2014/main" id="{DF73DC6C-5531-6F41-4D7F-9387B08DE909}"/>
+              </a:ext>
+            </a:extLst>
+          </p:cNvPr>
+          <p:cNvSpPr txBox="1"/>
+          <p:nvPr/>
+        </p:nvSpPr>
+        <p:spPr>
+          <a:xfrm>
+            <a:off x="2896748" y="3740849"/>
+            <a:ext cx="473206" cy="307777"/>
+          </a:xfrm>
+          <a:prstGeom prst="rect">
+            <a:avLst/>
+          </a:prstGeom>
+          <a:noFill/>
+        </p:spPr>
+        <p:txBody>
+          <a:bodyPr wrap="none" rtlCol="0">
+            <a:spAutoFit/>
+          </a:bodyPr>
+          <a:lstStyle/>
+          <a:p>
+            <a:r>
+              <a:rPr lang="en-US" altLang="zh-CN" sz="1400" b="1">
+                <a:solidFill>
+                  <a:srgbClr val="FF0000"/>
+                </a:solidFill>
+              </a:rPr>
+              <a:t>0x6</a:t>
+            </a:r>
+            <a:endParaRPr lang="zh-CN" altLang="en-US" sz="1400" b="1">
+              <a:solidFill>
+                <a:srgbClr val="FF0000"/>
+              </a:solidFill>
+            </a:endParaRPr>
+          </a:p>
+        </p:txBody>
+      </p:sp>
+      <p:sp>
+        <p:nvSpPr>
+          <p:cNvPr id="25" name="矩形 24">
+            <a:extLst>
+              <a:ext uri="{FF2B5EF4-FFF2-40B4-BE49-F238E27FC236}">
+                <a16:creationId xmlns:a16="http://schemas.microsoft.com/office/drawing/2014/main" id="{CF7C6324-4DAB-555A-8678-90A5833D973C}"/>
+              </a:ext>
+            </a:extLst>
+          </p:cNvPr>
+          <p:cNvSpPr/>
+          <p:nvPr/>
+        </p:nvSpPr>
+        <p:spPr>
+          <a:xfrm>
+            <a:off x="536076" y="2059896"/>
+            <a:ext cx="360000" cy="360000"/>
+          </a:xfrm>
+          <a:prstGeom prst="rect">
+            <a:avLst/>
+          </a:prstGeom>
+          <a:solidFill>
+            <a:srgbClr val="FDFFB6"/>
+          </a:solidFill>
+        </p:spPr>
+        <p:style>
+          <a:lnRef idx="2">
+            <a:schemeClr val="accent1">
+              <a:shade val="15000"/>
+            </a:schemeClr>
+          </a:lnRef>
+          <a:fillRef idx="1">
+            <a:schemeClr val="accent1"/>
+          </a:fillRef>
+          <a:effectRef idx="0">
+            <a:schemeClr val="accent1"/>
+          </a:effectRef>
+          <a:fontRef idx="minor">
+            <a:schemeClr val="lt1"/>
+          </a:fontRef>
+        </p:style>
+        <p:txBody>
+          <a:bodyPr rtlCol="0" anchor="ctr"/>
+          <a:lstStyle/>
+          <a:p>
+            <a:pPr algn="ctr"/>
+            <a:endParaRPr lang="zh-CN" altLang="en-US"/>
+          </a:p>
+        </p:txBody>
+      </p:sp>
+      <p:sp>
+        <p:nvSpPr>
+          <p:cNvPr id="26" name="矩形 25">
+            <a:extLst>
+              <a:ext uri="{FF2B5EF4-FFF2-40B4-BE49-F238E27FC236}">
+                <a16:creationId xmlns:a16="http://schemas.microsoft.com/office/drawing/2014/main" id="{640BA348-9FF3-F811-52F4-DE8770C3EC10}"/>
+              </a:ext>
+            </a:extLst>
+          </p:cNvPr>
+          <p:cNvSpPr/>
+          <p:nvPr/>
+        </p:nvSpPr>
+        <p:spPr>
+          <a:xfrm>
+            <a:off x="945048" y="2059896"/>
+            <a:ext cx="360000" cy="360000"/>
+          </a:xfrm>
+          <a:prstGeom prst="rect">
+            <a:avLst/>
+          </a:prstGeom>
+          <a:solidFill>
+            <a:srgbClr val="FDFFB6"/>
+          </a:solidFill>
+        </p:spPr>
+        <p:style>
+          <a:lnRef idx="2">
+            <a:schemeClr val="accent1">
+              <a:shade val="15000"/>
+            </a:schemeClr>
+          </a:lnRef>
+          <a:fillRef idx="1">
+            <a:schemeClr val="accent1"/>
+          </a:fillRef>
+          <a:effectRef idx="0">
+            <a:schemeClr val="accent1"/>
+          </a:effectRef>
+          <a:fontRef idx="minor">
+            <a:schemeClr val="lt1"/>
+          </a:fontRef>
+        </p:style>
+        <p:txBody>
+          <a:bodyPr rtlCol="0" anchor="ctr"/>
+          <a:lstStyle/>
+          <a:p>
+            <a:pPr algn="ctr"/>
+            <a:endParaRPr lang="zh-CN" altLang="en-US"/>
+          </a:p>
+        </p:txBody>
+      </p:sp>
+      <p:sp>
+        <p:nvSpPr>
+          <p:cNvPr id="27" name="矩形 26">
+            <a:extLst>
+              <a:ext uri="{FF2B5EF4-FFF2-40B4-BE49-F238E27FC236}">
+                <a16:creationId xmlns:a16="http://schemas.microsoft.com/office/drawing/2014/main" id="{E82F41F1-0252-659B-FC87-D7964AC127D1}"/>
+              </a:ext>
+            </a:extLst>
+          </p:cNvPr>
+          <p:cNvSpPr/>
+          <p:nvPr/>
+        </p:nvSpPr>
+        <p:spPr>
+          <a:xfrm>
+            <a:off x="1354020" y="2059896"/>
+            <a:ext cx="360000" cy="360000"/>
+          </a:xfrm>
+          <a:prstGeom prst="rect">
+            <a:avLst/>
+          </a:prstGeom>
+          <a:solidFill>
+            <a:srgbClr val="FDFFB6"/>
+          </a:solidFill>
+        </p:spPr>
+        <p:style>
+          <a:lnRef idx="2">
+            <a:schemeClr val="accent1">
+              <a:shade val="15000"/>
+            </a:schemeClr>
+          </a:lnRef>
+          <a:fillRef idx="1">
+            <a:schemeClr val="accent1"/>
+          </a:fillRef>
+          <a:effectRef idx="0">
+            <a:schemeClr val="accent1"/>
+          </a:effectRef>
+          <a:fontRef idx="minor">
+            <a:schemeClr val="lt1"/>
+          </a:fontRef>
+        </p:style>
+        <p:txBody>
+          <a:bodyPr rtlCol="0" anchor="ctr"/>
+          <a:lstStyle/>
+          <a:p>
+            <a:pPr algn="ctr"/>
+            <a:endParaRPr lang="zh-CN" altLang="en-US"/>
+          </a:p>
+        </p:txBody>
+      </p:sp>
+      <p:sp>
+        <p:nvSpPr>
+          <p:cNvPr id="28" name="矩形 27">
+            <a:extLst>
+              <a:ext uri="{FF2B5EF4-FFF2-40B4-BE49-F238E27FC236}">
+                <a16:creationId xmlns:a16="http://schemas.microsoft.com/office/drawing/2014/main" id="{33DB88C2-5111-0A96-F257-084F3E07FEBF}"/>
+              </a:ext>
+            </a:extLst>
+          </p:cNvPr>
+          <p:cNvSpPr/>
+          <p:nvPr/>
+        </p:nvSpPr>
+        <p:spPr>
+          <a:xfrm>
+            <a:off x="1762992" y="2059896"/>
+            <a:ext cx="360000" cy="360000"/>
+          </a:xfrm>
+          <a:prstGeom prst="rect">
+            <a:avLst/>
+          </a:prstGeom>
+          <a:solidFill>
+            <a:srgbClr val="FDFFB6"/>
+          </a:solidFill>
+        </p:spPr>
+        <p:style>
+          <a:lnRef idx="2">
+            <a:schemeClr val="accent1">
+              <a:shade val="15000"/>
+            </a:schemeClr>
+          </a:lnRef>
+          <a:fillRef idx="1">
+            <a:schemeClr val="accent1"/>
+          </a:fillRef>
+          <a:effectRef idx="0">
+            <a:schemeClr val="accent1"/>
+          </a:effectRef>
+          <a:fontRef idx="minor">
+            <a:schemeClr val="lt1"/>
+          </a:fontRef>
+        </p:style>
+        <p:txBody>
+          <a:bodyPr rtlCol="0" anchor="ctr"/>
+          <a:lstStyle/>
+          <a:p>
+            <a:pPr algn="ctr"/>
+            <a:endParaRPr lang="zh-CN" altLang="en-US"/>
+          </a:p>
+        </p:txBody>
+      </p:sp>
+      <p:sp>
+        <p:nvSpPr>
+          <p:cNvPr id="29" name="矩形 28">
+            <a:extLst>
+              <a:ext uri="{FF2B5EF4-FFF2-40B4-BE49-F238E27FC236}">
+                <a16:creationId xmlns:a16="http://schemas.microsoft.com/office/drawing/2014/main" id="{70BE112D-1F9D-AB16-4570-654E426DD99A}"/>
+              </a:ext>
+            </a:extLst>
+          </p:cNvPr>
+          <p:cNvSpPr/>
+          <p:nvPr/>
+        </p:nvSpPr>
+        <p:spPr>
+          <a:xfrm>
+            <a:off x="2171964" y="2059896"/>
+            <a:ext cx="360000" cy="360000"/>
+          </a:xfrm>
+          <a:prstGeom prst="rect">
+            <a:avLst/>
+          </a:prstGeom>
+          <a:solidFill>
+            <a:srgbClr val="FDFFB6"/>
+          </a:solidFill>
+        </p:spPr>
+        <p:style>
+          <a:lnRef idx="2">
+            <a:schemeClr val="accent1">
+              <a:shade val="15000"/>
+            </a:schemeClr>
+          </a:lnRef>
+          <a:fillRef idx="1">
+            <a:schemeClr val="accent1"/>
+          </a:fillRef>
+          <a:effectRef idx="0">
+            <a:schemeClr val="accent1"/>
+          </a:effectRef>
+          <a:fontRef idx="minor">
+            <a:schemeClr val="lt1"/>
+          </a:fontRef>
+        </p:style>
+        <p:txBody>
+          <a:bodyPr rtlCol="0" anchor="ctr"/>
+          <a:lstStyle/>
+          <a:p>
+            <a:pPr algn="ctr"/>
+            <a:endParaRPr lang="zh-CN" altLang="en-US"/>
+          </a:p>
+        </p:txBody>
+      </p:sp>
+      <p:sp>
+        <p:nvSpPr>
+          <p:cNvPr id="30" name="矩形 29">
+            <a:extLst>
+              <a:ext uri="{FF2B5EF4-FFF2-40B4-BE49-F238E27FC236}">
+                <a16:creationId xmlns:a16="http://schemas.microsoft.com/office/drawing/2014/main" id="{CA2B4752-E0A7-7F4C-E6AA-586E7C615317}"/>
+              </a:ext>
+            </a:extLst>
+          </p:cNvPr>
+          <p:cNvSpPr/>
+          <p:nvPr/>
+        </p:nvSpPr>
+        <p:spPr>
+          <a:xfrm>
+            <a:off x="2580936" y="2059896"/>
+            <a:ext cx="360000" cy="360000"/>
+          </a:xfrm>
+          <a:prstGeom prst="rect">
+            <a:avLst/>
+          </a:prstGeom>
+          <a:solidFill>
+            <a:srgbClr val="FDFFB6"/>
+          </a:solidFill>
+        </p:spPr>
+        <p:style>
+          <a:lnRef idx="2">
+            <a:schemeClr val="accent1">
+              <a:shade val="15000"/>
+            </a:schemeClr>
+          </a:lnRef>
+          <a:fillRef idx="1">
+            <a:schemeClr val="accent1"/>
+          </a:fillRef>
+          <a:effectRef idx="0">
+            <a:schemeClr val="accent1"/>
+          </a:effectRef>
+          <a:fontRef idx="minor">
+            <a:schemeClr val="lt1"/>
+          </a:fontRef>
+        </p:style>
+        <p:txBody>
+          <a:bodyPr rtlCol="0" anchor="ctr"/>
+          <a:lstStyle/>
+          <a:p>
+            <a:pPr algn="ctr"/>
+            <a:endParaRPr lang="zh-CN" altLang="en-US"/>
+          </a:p>
+        </p:txBody>
+      </p:sp>
+      <p:sp>
+        <p:nvSpPr>
+          <p:cNvPr id="31" name="矩形 30">
+            <a:extLst>
+              <a:ext uri="{FF2B5EF4-FFF2-40B4-BE49-F238E27FC236}">
+                <a16:creationId xmlns:a16="http://schemas.microsoft.com/office/drawing/2014/main" id="{483C0FBB-30AF-E00B-3E18-75889D856B57}"/>
+              </a:ext>
+            </a:extLst>
+          </p:cNvPr>
+          <p:cNvSpPr/>
+          <p:nvPr/>
+        </p:nvSpPr>
+        <p:spPr>
+          <a:xfrm>
+            <a:off x="2989908" y="2059896"/>
+            <a:ext cx="360000" cy="360000"/>
+          </a:xfrm>
+          <a:prstGeom prst="rect">
+            <a:avLst/>
+          </a:prstGeom>
+          <a:solidFill>
+            <a:srgbClr val="FDFFB6"/>
+          </a:solidFill>
+        </p:spPr>
+        <p:style>
+          <a:lnRef idx="2">
+            <a:schemeClr val="accent1">
+              <a:shade val="15000"/>
+            </a:schemeClr>
+          </a:lnRef>
+          <a:fillRef idx="1">
+            <a:schemeClr val="accent1"/>
+          </a:fillRef>
+          <a:effectRef idx="0">
+            <a:schemeClr val="accent1"/>
+          </a:effectRef>
+          <a:fontRef idx="minor">
+            <a:schemeClr val="lt1"/>
+          </a:fontRef>
+        </p:style>
+        <p:txBody>
+          <a:bodyPr rtlCol="0" anchor="ctr"/>
+          <a:lstStyle/>
+          <a:p>
+            <a:pPr algn="ctr"/>
+            <a:endParaRPr lang="zh-CN" altLang="en-US"/>
+          </a:p>
+        </p:txBody>
+      </p:sp>
+      <p:sp>
+        <p:nvSpPr>
+          <p:cNvPr id="32" name="矩形 31">
+            <a:extLst>
+              <a:ext uri="{FF2B5EF4-FFF2-40B4-BE49-F238E27FC236}">
+                <a16:creationId xmlns:a16="http://schemas.microsoft.com/office/drawing/2014/main" id="{39A56249-A6F7-41C0-D7A1-4E5B8C2E841E}"/>
+              </a:ext>
+            </a:extLst>
+          </p:cNvPr>
+          <p:cNvSpPr/>
+          <p:nvPr/>
+        </p:nvSpPr>
+        <p:spPr>
+          <a:xfrm>
+            <a:off x="3398879" y="2059896"/>
+            <a:ext cx="360000" cy="360000"/>
+          </a:xfrm>
+          <a:prstGeom prst="rect">
+            <a:avLst/>
+          </a:prstGeom>
+          <a:solidFill>
+            <a:srgbClr val="FDFFB6"/>
+          </a:solidFill>
+        </p:spPr>
+        <p:style>
+          <a:lnRef idx="2">
+            <a:schemeClr val="accent1">
+              <a:shade val="15000"/>
+            </a:schemeClr>
+          </a:lnRef>
+          <a:fillRef idx="1">
+            <a:schemeClr val="accent1"/>
+          </a:fillRef>
+          <a:effectRef idx="0">
+            <a:schemeClr val="accent1"/>
+          </a:effectRef>
+          <a:fontRef idx="minor">
+            <a:schemeClr val="lt1"/>
+          </a:fontRef>
+        </p:style>
+        <p:txBody>
+          <a:bodyPr rtlCol="0" anchor="ctr"/>
+          <a:lstStyle/>
+          <a:p>
+            <a:pPr algn="ctr"/>
+            <a:endParaRPr lang="zh-CN" altLang="en-US"/>
+          </a:p>
+        </p:txBody>
+      </p:sp>
+      <p:sp>
+        <p:nvSpPr>
+          <p:cNvPr id="33" name="文本框 32">
+            <a:extLst>
+              <a:ext uri="{FF2B5EF4-FFF2-40B4-BE49-F238E27FC236}">
+                <a16:creationId xmlns:a16="http://schemas.microsoft.com/office/drawing/2014/main" id="{C357571B-E2A2-505F-F5E8-A7844C70B6C6}"/>
+              </a:ext>
+            </a:extLst>
+          </p:cNvPr>
+          <p:cNvSpPr txBox="1"/>
+          <p:nvPr/>
+        </p:nvSpPr>
+        <p:spPr>
+          <a:xfrm>
+            <a:off x="471842" y="1690564"/>
+            <a:ext cx="473206" cy="307777"/>
+          </a:xfrm>
+          <a:prstGeom prst="rect">
+            <a:avLst/>
+          </a:prstGeom>
+          <a:noFill/>
+        </p:spPr>
+        <p:txBody>
+          <a:bodyPr wrap="none" rtlCol="0">
+            <a:spAutoFit/>
+          </a:bodyPr>
+          <a:lstStyle/>
+          <a:p>
+            <a:r>
+              <a:rPr lang="en-US" altLang="zh-CN" sz="1400" b="1">
+                <a:solidFill>
+                  <a:srgbClr val="FF0000"/>
+                </a:solidFill>
+              </a:rPr>
+              <a:t>0x8</a:t>
+            </a:r>
+            <a:endParaRPr lang="zh-CN" altLang="en-US" sz="1400" b="1">
+              <a:solidFill>
+                <a:srgbClr val="FF0000"/>
+              </a:solidFill>
+            </a:endParaRPr>
+          </a:p>
+        </p:txBody>
+      </p:sp>
+      <p:sp>
+        <p:nvSpPr>
+          <p:cNvPr id="34" name="文本框 33">
+            <a:extLst>
+              <a:ext uri="{FF2B5EF4-FFF2-40B4-BE49-F238E27FC236}">
+                <a16:creationId xmlns:a16="http://schemas.microsoft.com/office/drawing/2014/main" id="{E90DA1B7-5F82-3B24-0701-8ADCF7CD0B0B}"/>
+              </a:ext>
+            </a:extLst>
+          </p:cNvPr>
+          <p:cNvSpPr txBox="1"/>
+          <p:nvPr/>
+        </p:nvSpPr>
+        <p:spPr>
+          <a:xfrm>
+            <a:off x="3363425" y="1690564"/>
+            <a:ext cx="463588" cy="307777"/>
+          </a:xfrm>
+          <a:prstGeom prst="rect">
+            <a:avLst/>
+          </a:prstGeom>
+          <a:noFill/>
+        </p:spPr>
+        <p:txBody>
+          <a:bodyPr wrap="none" rtlCol="0">
+            <a:spAutoFit/>
+          </a:bodyPr>
+          <a:lstStyle/>
+          <a:p>
+            <a:r>
+              <a:rPr lang="en-US" altLang="zh-CN" sz="1400" b="1">
+                <a:solidFill>
+                  <a:srgbClr val="FF0000"/>
+                </a:solidFill>
+              </a:rPr>
+              <a:t>0xF</a:t>
+            </a:r>
+            <a:endParaRPr lang="zh-CN" altLang="en-US" sz="1400" b="1">
+              <a:solidFill>
+                <a:srgbClr val="FF0000"/>
+              </a:solidFill>
+            </a:endParaRPr>
+          </a:p>
+        </p:txBody>
+      </p:sp>
+      <p:sp>
+        <p:nvSpPr>
+          <p:cNvPr id="35" name="文本框 34">
+            <a:extLst>
+              <a:ext uri="{FF2B5EF4-FFF2-40B4-BE49-F238E27FC236}">
+                <a16:creationId xmlns:a16="http://schemas.microsoft.com/office/drawing/2014/main" id="{50D4694A-6927-0ED9-6238-A48156464C30}"/>
+              </a:ext>
+            </a:extLst>
+          </p:cNvPr>
+          <p:cNvSpPr txBox="1"/>
+          <p:nvPr/>
+        </p:nvSpPr>
+        <p:spPr>
+          <a:xfrm>
+            <a:off x="2467730" y="1690564"/>
+            <a:ext cx="502061" cy="307777"/>
+          </a:xfrm>
+          <a:prstGeom prst="rect">
+            <a:avLst/>
+          </a:prstGeom>
+          <a:noFill/>
+        </p:spPr>
+        <p:txBody>
+          <a:bodyPr wrap="none" rtlCol="0">
+            <a:spAutoFit/>
+          </a:bodyPr>
+          <a:lstStyle/>
+          <a:p>
+            <a:r>
+              <a:rPr lang="en-US" altLang="zh-CN" sz="1400" b="1">
+                <a:solidFill>
+                  <a:srgbClr val="FF0000"/>
+                </a:solidFill>
+              </a:rPr>
+              <a:t>0xD</a:t>
+            </a:r>
+            <a:endParaRPr lang="zh-CN" altLang="en-US" sz="1400" b="1">
+              <a:solidFill>
+                <a:srgbClr val="FF0000"/>
+              </a:solidFill>
+            </a:endParaRPr>
+          </a:p>
+        </p:txBody>
+      </p:sp>
+      <p:sp>
+        <p:nvSpPr>
+          <p:cNvPr id="36" name="左大括号 35">
+            <a:extLst>
+              <a:ext uri="{FF2B5EF4-FFF2-40B4-BE49-F238E27FC236}">
+                <a16:creationId xmlns:a16="http://schemas.microsoft.com/office/drawing/2014/main" id="{E95F017B-54B1-6F15-EA38-94C361160C3A}"/>
+              </a:ext>
+            </a:extLst>
+          </p:cNvPr>
+          <p:cNvSpPr/>
+          <p:nvPr/>
+        </p:nvSpPr>
+        <p:spPr>
+          <a:xfrm rot="16200000">
+            <a:off x="4637346" y="3114870"/>
+            <a:ext cx="184404" cy="3220583"/>
+          </a:xfrm>
+          <a:prstGeom prst="leftBrace">
+            <a:avLst/>
+          </a:prstGeom>
+        </p:spPr>
+        <p:style>
+          <a:lnRef idx="1">
+            <a:schemeClr val="dk1"/>
+          </a:lnRef>
+          <a:fillRef idx="0">
+            <a:schemeClr val="dk1"/>
+          </a:fillRef>
+          <a:effectRef idx="0">
+            <a:schemeClr val="dk1"/>
+          </a:effectRef>
+          <a:fontRef idx="minor">
+            <a:schemeClr val="tx1"/>
+          </a:fontRef>
+        </p:style>
+        <p:txBody>
+          <a:bodyPr rtlCol="0" anchor="ctr"/>
+          <a:lstStyle/>
+          <a:p>
+            <a:pPr algn="ctr"/>
+            <a:endParaRPr lang="zh-CN" altLang="en-US"/>
+          </a:p>
+        </p:txBody>
+      </p:sp>
+      <p:sp>
+        <p:nvSpPr>
+          <p:cNvPr id="37" name="文本框 36">
+            <a:extLst>
+              <a:ext uri="{FF2B5EF4-FFF2-40B4-BE49-F238E27FC236}">
+                <a16:creationId xmlns:a16="http://schemas.microsoft.com/office/drawing/2014/main" id="{02BE19FB-9D74-7CCF-268D-3FA7CA904557}"/>
+              </a:ext>
+            </a:extLst>
+          </p:cNvPr>
+          <p:cNvSpPr txBox="1"/>
+          <p:nvPr/>
+        </p:nvSpPr>
+        <p:spPr>
+          <a:xfrm>
+            <a:off x="4565283" y="4795475"/>
+            <a:ext cx="311304" cy="369332"/>
+          </a:xfrm>
+          <a:prstGeom prst="rect">
+            <a:avLst/>
+          </a:prstGeom>
+          <a:noFill/>
+        </p:spPr>
+        <p:txBody>
+          <a:bodyPr wrap="none" rtlCol="0">
+            <a:spAutoFit/>
+          </a:bodyPr>
+          <a:lstStyle/>
+          <a:p>
+            <a:r>
+              <a:rPr lang="en-US" altLang="zh-CN" b="1">
+                <a:latin typeface="Consolas" panose="020B0609020204030204" pitchFamily="49" charset="0"/>
+              </a:rPr>
+              <a:t>x</a:t>
+            </a:r>
+            <a:endParaRPr lang="zh-CN" altLang="en-US" b="1">
+              <a:latin typeface="Consolas" panose="020B0609020204030204" pitchFamily="49" charset="0"/>
+            </a:endParaRPr>
+          </a:p>
+        </p:txBody>
+      </p:sp>
+      <p:sp>
+        <p:nvSpPr>
+          <p:cNvPr id="38" name="文本框 37">
+            <a:extLst>
+              <a:ext uri="{FF2B5EF4-FFF2-40B4-BE49-F238E27FC236}">
+                <a16:creationId xmlns:a16="http://schemas.microsoft.com/office/drawing/2014/main" id="{963F3CFE-B840-973E-9587-F60B12B86C02}"/>
+              </a:ext>
+            </a:extLst>
+          </p:cNvPr>
+          <p:cNvSpPr txBox="1"/>
+          <p:nvPr/>
+        </p:nvSpPr>
+        <p:spPr>
+          <a:xfrm>
+            <a:off x="1945972" y="1231138"/>
+            <a:ext cx="311304" cy="369332"/>
+          </a:xfrm>
+          <a:prstGeom prst="rect">
+            <a:avLst/>
+          </a:prstGeom>
+          <a:noFill/>
+        </p:spPr>
+        <p:txBody>
+          <a:bodyPr wrap="none" rtlCol="0">
+            <a:spAutoFit/>
+          </a:bodyPr>
+          <a:lstStyle/>
+          <a:p>
+            <a:r>
+              <a:rPr lang="en-US" altLang="zh-CN" b="1">
+                <a:latin typeface="Consolas" panose="020B0609020204030204" pitchFamily="49" charset="0"/>
+              </a:rPr>
+              <a:t>x</a:t>
+            </a:r>
+            <a:endParaRPr lang="zh-CN" altLang="en-US" b="1">
+              <a:latin typeface="Consolas" panose="020B0609020204030204" pitchFamily="49" charset="0"/>
+            </a:endParaRPr>
+          </a:p>
+        </p:txBody>
+      </p:sp>
+      <p:sp>
+        <p:nvSpPr>
+          <p:cNvPr id="39" name="左大括号 38">
+            <a:extLst>
+              <a:ext uri="{FF2B5EF4-FFF2-40B4-BE49-F238E27FC236}">
+                <a16:creationId xmlns:a16="http://schemas.microsoft.com/office/drawing/2014/main" id="{D7E783C6-C2DD-0186-4AD5-AA3213308548}"/>
+              </a:ext>
+            </a:extLst>
+          </p:cNvPr>
+          <p:cNvSpPr/>
+          <p:nvPr/>
+        </p:nvSpPr>
+        <p:spPr>
+          <a:xfrm rot="5400000">
+            <a:off x="2009422" y="36814"/>
+            <a:ext cx="184404" cy="3220583"/>
+          </a:xfrm>
+          <a:prstGeom prst="leftBrace">
+            <a:avLst/>
+          </a:prstGeom>
+        </p:spPr>
+        <p:style>
+          <a:lnRef idx="1">
+            <a:schemeClr val="dk1"/>
+          </a:lnRef>
+          <a:fillRef idx="0">
+            <a:schemeClr val="dk1"/>
+          </a:fillRef>
+          <a:effectRef idx="0">
+            <a:schemeClr val="dk1"/>
+          </a:effectRef>
+          <a:fontRef idx="minor">
+            <a:schemeClr val="tx1"/>
+          </a:fontRef>
+        </p:style>
+        <p:txBody>
+          <a:bodyPr rtlCol="0" anchor="ctr"/>
+          <a:lstStyle/>
+          <a:p>
+            <a:pPr algn="ctr"/>
+            <a:endParaRPr lang="zh-CN" altLang="en-US"/>
+          </a:p>
+        </p:txBody>
+      </p:sp>
+      <p:sp>
+        <p:nvSpPr>
+          <p:cNvPr id="40" name="文本框 39">
+            <a:extLst>
+              <a:ext uri="{FF2B5EF4-FFF2-40B4-BE49-F238E27FC236}">
+                <a16:creationId xmlns:a16="http://schemas.microsoft.com/office/drawing/2014/main" id="{FF5A433D-1B7A-6620-B8D4-B173ABF52EB6}"/>
+              </a:ext>
+            </a:extLst>
+          </p:cNvPr>
+          <p:cNvSpPr txBox="1"/>
+          <p:nvPr/>
+        </p:nvSpPr>
+        <p:spPr>
+          <a:xfrm>
+            <a:off x="874709" y="2635940"/>
+            <a:ext cx="2650084" cy="369332"/>
+          </a:xfrm>
+          <a:prstGeom prst="rect">
+            <a:avLst/>
+          </a:prstGeom>
+          <a:noFill/>
+        </p:spPr>
+        <p:txBody>
+          <a:bodyPr wrap="none" rtlCol="0">
+            <a:spAutoFit/>
+          </a:bodyPr>
+          <a:lstStyle/>
+          <a:p>
+            <a:r>
+              <a:rPr lang="en-US" altLang="zh-CN" b="1">
+                <a:latin typeface="Consolas" panose="020B0609020204030204" pitchFamily="49" charset="0"/>
+              </a:rPr>
+              <a:t>addr = 0x8; 64</a:t>
+            </a:r>
+            <a:r>
+              <a:rPr lang="zh-CN" altLang="en-US" b="1">
+                <a:latin typeface="Consolas" panose="020B0609020204030204" pitchFamily="49" charset="0"/>
+              </a:rPr>
+              <a:t>位对齐</a:t>
+            </a:r>
+          </a:p>
+        </p:txBody>
+      </p:sp>
+      <p:sp>
+        <p:nvSpPr>
+          <p:cNvPr id="41" name="文本框 40">
+            <a:extLst>
+              <a:ext uri="{FF2B5EF4-FFF2-40B4-BE49-F238E27FC236}">
+                <a16:creationId xmlns:a16="http://schemas.microsoft.com/office/drawing/2014/main" id="{BCCA586E-37FC-05CB-734C-CAACE7C43C81}"/>
+              </a:ext>
+            </a:extLst>
+          </p:cNvPr>
+          <p:cNvSpPr txBox="1"/>
+          <p:nvPr/>
+        </p:nvSpPr>
+        <p:spPr>
+          <a:xfrm>
+            <a:off x="378162" y="785913"/>
+            <a:ext cx="1451038" cy="369332"/>
+          </a:xfrm>
+          <a:prstGeom prst="rect">
+            <a:avLst/>
+          </a:prstGeom>
+          <a:noFill/>
+        </p:spPr>
+        <p:txBody>
+          <a:bodyPr wrap="none" rtlCol="0">
+            <a:spAutoFit/>
+          </a:bodyPr>
+          <a:lstStyle/>
+          <a:p>
+            <a:r>
+              <a:rPr lang="en-US" altLang="zh-CN">
+                <a:latin typeface="Consolas" panose="020B0609020204030204" pitchFamily="49" charset="0"/>
+              </a:rPr>
+              <a:t>int64_t x;</a:t>
+            </a:r>
+            <a:endParaRPr lang="zh-CN" altLang="en-US">
+              <a:latin typeface="Consolas" panose="020B0609020204030204" pitchFamily="49" charset="0"/>
+            </a:endParaRPr>
+          </a:p>
+        </p:txBody>
+      </p:sp>
+      <p:sp>
+        <p:nvSpPr>
+          <p:cNvPr id="42" name="椭圆 41">
+            <a:extLst>
+              <a:ext uri="{FF2B5EF4-FFF2-40B4-BE49-F238E27FC236}">
+                <a16:creationId xmlns:a16="http://schemas.microsoft.com/office/drawing/2014/main" id="{5C107F3D-F2ED-CD7B-0541-E01A0866C941}"/>
+              </a:ext>
+            </a:extLst>
+          </p:cNvPr>
+          <p:cNvSpPr/>
+          <p:nvPr/>
+        </p:nvSpPr>
+        <p:spPr>
+          <a:xfrm>
+            <a:off x="304800" y="1924236"/>
+            <a:ext cx="3901440" cy="643286"/>
+          </a:xfrm>
+          <a:prstGeom prst="ellipse">
+            <a:avLst/>
+          </a:prstGeom>
+          <a:noFill/>
+          <a:ln>
+            <a:solidFill>
+              <a:srgbClr val="FFC000"/>
+            </a:solidFill>
+          </a:ln>
+        </p:spPr>
+        <p:style>
+          <a:lnRef idx="2">
+            <a:schemeClr val="accent1">
+              <a:shade val="15000"/>
+            </a:schemeClr>
+          </a:lnRef>
+          <a:fillRef idx="1">
+            <a:schemeClr val="accent1"/>
+          </a:fillRef>
+          <a:effectRef idx="0">
+            <a:schemeClr val="accent1"/>
+          </a:effectRef>
+          <a:fontRef idx="minor">
+            <a:schemeClr val="lt1"/>
+          </a:fontRef>
+        </p:style>
+        <p:txBody>
+          <a:bodyPr rtlCol="0" anchor="ctr"/>
+          <a:lstStyle/>
+          <a:p>
+            <a:pPr algn="ctr"/>
+            <a:endParaRPr lang="zh-CN" altLang="en-US"/>
+          </a:p>
+        </p:txBody>
+      </p:sp>
+      <p:cxnSp>
+        <p:nvCxnSpPr>
+          <p:cNvPr id="44" name="直接箭头连接符 43">
+            <a:extLst>
+              <a:ext uri="{FF2B5EF4-FFF2-40B4-BE49-F238E27FC236}">
+                <a16:creationId xmlns:a16="http://schemas.microsoft.com/office/drawing/2014/main" id="{9120769E-E2C5-D506-7DB3-083A2B3DE43D}"/>
+              </a:ext>
+            </a:extLst>
+          </p:cNvPr>
+          <p:cNvCxnSpPr>
+            <a:stCxn id="42" idx="6"/>
+          </p:cNvCxnSpPr>
+          <p:nvPr/>
+        </p:nvCxnSpPr>
+        <p:spPr>
+          <a:xfrm flipV="1">
+            <a:off x="4206240" y="2240280"/>
+            <a:ext cx="876300" cy="5599"/>
+          </a:xfrm>
+          <a:prstGeom prst="straightConnector1">
+            <a:avLst/>
+          </a:prstGeom>
+          <a:ln>
+            <a:tailEnd type="triangle"/>
+          </a:ln>
+        </p:spPr>
+        <p:style>
+          <a:lnRef idx="1">
+            <a:schemeClr val="accent1"/>
+          </a:lnRef>
+          <a:fillRef idx="0">
+            <a:schemeClr val="accent1"/>
+          </a:fillRef>
+          <a:effectRef idx="0">
+            <a:schemeClr val="accent1"/>
+          </a:effectRef>
+          <a:fontRef idx="minor">
+            <a:schemeClr val="tx1"/>
+          </a:fontRef>
+        </p:style>
+      </p:cxnSp>
+      <p:sp>
+        <p:nvSpPr>
+          <p:cNvPr id="45" name="文本框 44">
+            <a:extLst>
+              <a:ext uri="{FF2B5EF4-FFF2-40B4-BE49-F238E27FC236}">
+                <a16:creationId xmlns:a16="http://schemas.microsoft.com/office/drawing/2014/main" id="{39984D57-8606-24FA-E7C9-E4DEA5A5FAD5}"/>
+              </a:ext>
+            </a:extLst>
+          </p:cNvPr>
+          <p:cNvSpPr txBox="1"/>
+          <p:nvPr/>
+        </p:nvSpPr>
+        <p:spPr>
+          <a:xfrm>
+            <a:off x="5082540" y="2073115"/>
+            <a:ext cx="2274982" cy="369332"/>
+          </a:xfrm>
+          <a:prstGeom prst="rect">
+            <a:avLst/>
+          </a:prstGeom>
+          <a:noFill/>
+        </p:spPr>
+        <p:txBody>
+          <a:bodyPr wrap="none" rtlCol="0">
+            <a:spAutoFit/>
+          </a:bodyPr>
+          <a:lstStyle/>
+          <a:p>
+            <a:r>
+              <a:rPr lang="en-US" altLang="zh-CN" b="1">
+                <a:latin typeface="Consolas" panose="020B0609020204030204" pitchFamily="49" charset="0"/>
+              </a:rPr>
+              <a:t>64</a:t>
+            </a:r>
+            <a:r>
+              <a:rPr lang="zh-CN" altLang="en-US" b="1">
+                <a:latin typeface="Consolas" panose="020B0609020204030204" pitchFamily="49" charset="0"/>
+              </a:rPr>
+              <a:t>位计算机一次读取</a:t>
+            </a:r>
+          </a:p>
+        </p:txBody>
+      </p:sp>
+      <p:sp>
+        <p:nvSpPr>
+          <p:cNvPr id="46" name="文本框 45">
+            <a:extLst>
+              <a:ext uri="{FF2B5EF4-FFF2-40B4-BE49-F238E27FC236}">
+                <a16:creationId xmlns:a16="http://schemas.microsoft.com/office/drawing/2014/main" id="{7409A8BF-F7D4-41DA-37C7-7D03B33117FD}"/>
+              </a:ext>
+            </a:extLst>
+          </p:cNvPr>
+          <p:cNvSpPr txBox="1"/>
+          <p:nvPr/>
+        </p:nvSpPr>
+        <p:spPr>
+          <a:xfrm>
+            <a:off x="3534909" y="5021596"/>
+            <a:ext cx="2396810" cy="369332"/>
+          </a:xfrm>
+          <a:prstGeom prst="rect">
+            <a:avLst/>
+          </a:prstGeom>
+          <a:noFill/>
+        </p:spPr>
+        <p:txBody>
+          <a:bodyPr wrap="none" rtlCol="0">
+            <a:spAutoFit/>
+          </a:bodyPr>
+          <a:lstStyle/>
+          <a:p>
+            <a:r>
+              <a:rPr lang="en-US" altLang="zh-CN" b="1">
+                <a:latin typeface="Consolas" panose="020B0609020204030204" pitchFamily="49" charset="0"/>
+              </a:rPr>
+              <a:t>addr = 0x6; </a:t>
+            </a:r>
+            <a:r>
+              <a:rPr lang="zh-CN" altLang="en-US" b="1">
+                <a:latin typeface="Consolas" panose="020B0609020204030204" pitchFamily="49" charset="0"/>
+              </a:rPr>
+              <a:t>未对齐</a:t>
+            </a:r>
+          </a:p>
+        </p:txBody>
+      </p:sp>
+      <p:sp>
+        <p:nvSpPr>
+          <p:cNvPr id="47" name="椭圆 46">
+            <a:extLst>
+              <a:ext uri="{FF2B5EF4-FFF2-40B4-BE49-F238E27FC236}">
+                <a16:creationId xmlns:a16="http://schemas.microsoft.com/office/drawing/2014/main" id="{4445BFA3-5322-3D0E-DC15-6F0DDACAE4E6}"/>
+              </a:ext>
+            </a:extLst>
+          </p:cNvPr>
+          <p:cNvSpPr/>
+          <p:nvPr/>
+        </p:nvSpPr>
+        <p:spPr>
+          <a:xfrm>
+            <a:off x="109185" y="4015259"/>
+            <a:ext cx="3901440" cy="643286"/>
+          </a:xfrm>
+          <a:prstGeom prst="ellipse">
+            <a:avLst/>
+          </a:prstGeom>
+          <a:noFill/>
+          <a:ln>
+            <a:solidFill>
+              <a:srgbClr val="FFC000"/>
+            </a:solidFill>
+          </a:ln>
+        </p:spPr>
+        <p:style>
+          <a:lnRef idx="2">
+            <a:schemeClr val="accent1">
+              <a:shade val="15000"/>
+            </a:schemeClr>
+          </a:lnRef>
+          <a:fillRef idx="1">
+            <a:schemeClr val="accent1"/>
+          </a:fillRef>
+          <a:effectRef idx="0">
+            <a:schemeClr val="accent1"/>
+          </a:effectRef>
+          <a:fontRef idx="minor">
+            <a:schemeClr val="lt1"/>
+          </a:fontRef>
+        </p:style>
+        <p:txBody>
+          <a:bodyPr rtlCol="0" anchor="ctr"/>
+          <a:lstStyle/>
+          <a:p>
+            <a:pPr algn="ctr"/>
+            <a:endParaRPr lang="zh-CN" altLang="en-US"/>
+          </a:p>
+        </p:txBody>
+      </p:sp>
+      <p:sp>
+        <p:nvSpPr>
+          <p:cNvPr id="48" name="椭圆 47">
+            <a:extLst>
+              <a:ext uri="{FF2B5EF4-FFF2-40B4-BE49-F238E27FC236}">
+                <a16:creationId xmlns:a16="http://schemas.microsoft.com/office/drawing/2014/main" id="{1C17C412-D3BA-3187-5BC0-D84277C27937}"/>
+              </a:ext>
+            </a:extLst>
+          </p:cNvPr>
+          <p:cNvSpPr/>
+          <p:nvPr/>
+        </p:nvSpPr>
+        <p:spPr>
+          <a:xfrm>
+            <a:off x="3854956" y="3981892"/>
+            <a:ext cx="3901440" cy="643286"/>
+          </a:xfrm>
+          <a:prstGeom prst="ellipse">
+            <a:avLst/>
+          </a:prstGeom>
+          <a:noFill/>
+          <a:ln>
+            <a:solidFill>
+              <a:srgbClr val="00B050"/>
+            </a:solidFill>
+          </a:ln>
+        </p:spPr>
+        <p:style>
+          <a:lnRef idx="2">
+            <a:schemeClr val="accent1">
+              <a:shade val="15000"/>
+            </a:schemeClr>
+          </a:lnRef>
+          <a:fillRef idx="1">
+            <a:schemeClr val="accent1"/>
+          </a:fillRef>
+          <a:effectRef idx="0">
+            <a:schemeClr val="accent1"/>
+          </a:effectRef>
+          <a:fontRef idx="minor">
+            <a:schemeClr val="lt1"/>
+          </a:fontRef>
+        </p:style>
+        <p:txBody>
+          <a:bodyPr rtlCol="0" anchor="ctr"/>
+          <a:lstStyle/>
+          <a:p>
+            <a:pPr algn="ctr"/>
+            <a:endParaRPr lang="zh-CN" altLang="en-US"/>
+          </a:p>
+        </p:txBody>
+      </p:sp>
+      <p:cxnSp>
+        <p:nvCxnSpPr>
+          <p:cNvPr id="50" name="直接箭头连接符 49">
+            <a:extLst>
+              <a:ext uri="{FF2B5EF4-FFF2-40B4-BE49-F238E27FC236}">
+                <a16:creationId xmlns:a16="http://schemas.microsoft.com/office/drawing/2014/main" id="{E039FBA0-A56F-C9A5-A9FA-40E28917F958}"/>
+              </a:ext>
+            </a:extLst>
+          </p:cNvPr>
+          <p:cNvCxnSpPr>
+            <a:stCxn id="47" idx="4"/>
+          </p:cNvCxnSpPr>
+          <p:nvPr/>
+        </p:nvCxnSpPr>
+        <p:spPr>
+          <a:xfrm>
+            <a:off x="2059905" y="4658545"/>
+            <a:ext cx="908636" cy="1277435"/>
+          </a:xfrm>
+          <a:prstGeom prst="straightConnector1">
+            <a:avLst/>
+          </a:prstGeom>
+          <a:ln>
+            <a:tailEnd type="triangle"/>
+          </a:ln>
+        </p:spPr>
+        <p:style>
+          <a:lnRef idx="1">
+            <a:schemeClr val="accent1"/>
+          </a:lnRef>
+          <a:fillRef idx="0">
+            <a:schemeClr val="accent1"/>
+          </a:fillRef>
+          <a:effectRef idx="0">
+            <a:schemeClr val="accent1"/>
+          </a:effectRef>
+          <a:fontRef idx="minor">
+            <a:schemeClr val="tx1"/>
+          </a:fontRef>
+        </p:style>
+      </p:cxnSp>
+      <p:cxnSp>
+        <p:nvCxnSpPr>
+          <p:cNvPr id="52" name="直接箭头连接符 51">
+            <a:extLst>
+              <a:ext uri="{FF2B5EF4-FFF2-40B4-BE49-F238E27FC236}">
+                <a16:creationId xmlns:a16="http://schemas.microsoft.com/office/drawing/2014/main" id="{B101EC4E-C61A-B799-6503-3AD57DF52C55}"/>
+              </a:ext>
+            </a:extLst>
+          </p:cNvPr>
+          <p:cNvCxnSpPr>
+            <a:stCxn id="48" idx="4"/>
+          </p:cNvCxnSpPr>
+          <p:nvPr/>
+        </p:nvCxnSpPr>
+        <p:spPr>
+          <a:xfrm flipH="1">
+            <a:off x="3737512" y="4625178"/>
+            <a:ext cx="2068164" cy="1310802"/>
+          </a:xfrm>
+          <a:prstGeom prst="straightConnector1">
+            <a:avLst/>
+          </a:prstGeom>
+          <a:ln>
+            <a:tailEnd type="triangle"/>
+          </a:ln>
+        </p:spPr>
+        <p:style>
+          <a:lnRef idx="1">
+            <a:schemeClr val="accent1"/>
+          </a:lnRef>
+          <a:fillRef idx="0">
+            <a:schemeClr val="accent1"/>
+          </a:fillRef>
+          <a:effectRef idx="0">
+            <a:schemeClr val="accent1"/>
+          </a:effectRef>
+          <a:fontRef idx="minor">
+            <a:schemeClr val="tx1"/>
+          </a:fontRef>
+        </p:style>
+      </p:cxnSp>
+      <p:sp>
+        <p:nvSpPr>
+          <p:cNvPr id="53" name="文本框 52">
+            <a:extLst>
+              <a:ext uri="{FF2B5EF4-FFF2-40B4-BE49-F238E27FC236}">
+                <a16:creationId xmlns:a16="http://schemas.microsoft.com/office/drawing/2014/main" id="{57AB9D87-D3BE-A718-2DF9-8FAAC437ADD7}"/>
+              </a:ext>
+            </a:extLst>
+          </p:cNvPr>
+          <p:cNvSpPr txBox="1"/>
+          <p:nvPr/>
+        </p:nvSpPr>
+        <p:spPr>
+          <a:xfrm>
+            <a:off x="1921625" y="5353153"/>
+            <a:ext cx="902811" cy="307777"/>
+          </a:xfrm>
+          <a:prstGeom prst="rect">
+            <a:avLst/>
+          </a:prstGeom>
+          <a:noFill/>
+        </p:spPr>
+        <p:txBody>
+          <a:bodyPr wrap="none" rtlCol="0">
+            <a:spAutoFit/>
+          </a:bodyPr>
+          <a:lstStyle/>
+          <a:p>
+            <a:r>
+              <a:rPr lang="zh-CN" altLang="en-US" sz="1400" b="1">
+                <a:solidFill>
+                  <a:srgbClr val="FF0000"/>
+                </a:solidFill>
+                <a:latin typeface="Consolas" panose="020B0609020204030204" pitchFamily="49" charset="0"/>
+              </a:rPr>
+              <a:t>第一次读</a:t>
+            </a:r>
+          </a:p>
+        </p:txBody>
+      </p:sp>
+      <p:sp>
+        <p:nvSpPr>
+          <p:cNvPr id="54" name="文本框 53">
+            <a:extLst>
+              <a:ext uri="{FF2B5EF4-FFF2-40B4-BE49-F238E27FC236}">
+                <a16:creationId xmlns:a16="http://schemas.microsoft.com/office/drawing/2014/main" id="{65C3B48C-0275-E82F-16A0-EAE6BC68CF70}"/>
+              </a:ext>
+            </a:extLst>
+          </p:cNvPr>
+          <p:cNvSpPr txBox="1"/>
+          <p:nvPr/>
+        </p:nvSpPr>
+        <p:spPr>
+          <a:xfrm>
+            <a:off x="3758879" y="5507041"/>
+            <a:ext cx="922047" cy="307777"/>
+          </a:xfrm>
+          <a:prstGeom prst="rect">
+            <a:avLst/>
+          </a:prstGeom>
+          <a:noFill/>
+        </p:spPr>
+        <p:txBody>
+          <a:bodyPr wrap="none" rtlCol="0">
+            <a:spAutoFit/>
+          </a:bodyPr>
+          <a:lstStyle/>
+          <a:p>
+            <a:r>
+              <a:rPr lang="zh-CN" altLang="en-US" sz="1400" b="1">
+                <a:solidFill>
+                  <a:srgbClr val="FF0000"/>
+                </a:solidFill>
+                <a:latin typeface="Consolas" panose="020B0609020204030204" pitchFamily="49" charset="0"/>
+              </a:rPr>
+              <a:t>第二次读</a:t>
+            </a:r>
+          </a:p>
+        </p:txBody>
+      </p:sp>
+      <p:sp>
+        <p:nvSpPr>
+          <p:cNvPr id="55" name="文本框 54">
+            <a:extLst>
+              <a:ext uri="{FF2B5EF4-FFF2-40B4-BE49-F238E27FC236}">
+                <a16:creationId xmlns:a16="http://schemas.microsoft.com/office/drawing/2014/main" id="{F1064CCC-99EC-36D1-F96F-31CD1590A94E}"/>
+              </a:ext>
+            </a:extLst>
+          </p:cNvPr>
+          <p:cNvSpPr txBox="1"/>
+          <p:nvPr/>
+        </p:nvSpPr>
+        <p:spPr>
+          <a:xfrm>
+            <a:off x="2821915" y="5963591"/>
+            <a:ext cx="1002197" cy="307777"/>
+          </a:xfrm>
+          <a:prstGeom prst="rect">
+            <a:avLst/>
+          </a:prstGeom>
+          <a:noFill/>
+        </p:spPr>
+        <p:txBody>
+          <a:bodyPr wrap="none" rtlCol="0">
+            <a:spAutoFit/>
+          </a:bodyPr>
+          <a:lstStyle/>
+          <a:p>
+            <a:r>
+              <a:rPr lang="zh-CN" altLang="en-US" sz="1400" b="1">
+                <a:latin typeface="Consolas" panose="020B0609020204030204" pitchFamily="49" charset="0"/>
+              </a:rPr>
+              <a:t>拼接得到</a:t>
+            </a:r>
+            <a:r>
+              <a:rPr lang="en-US" altLang="zh-CN" sz="1400" b="1">
+                <a:latin typeface="Consolas" panose="020B0609020204030204" pitchFamily="49" charset="0"/>
+              </a:rPr>
+              <a:t>x</a:t>
+            </a:r>
+            <a:endParaRPr lang="zh-CN" altLang="en-US" sz="1400" b="1">
+              <a:latin typeface="Consolas" panose="020B0609020204030204" pitchFamily="49" charset="0"/>
+            </a:endParaRPr>
+          </a:p>
+        </p:txBody>
+      </p:sp>
     </p:spTree>
     <p:extLst>
       <p:ext uri="{BB962C8B-B14F-4D97-AF65-F5344CB8AC3E}">

</xml_diff>